<commit_message>
fix error in loops py
</commit_message>
<xml_diff>
--- a/en/PyProgrammingLessons/Loops.pptx
+++ b/en/PyProgrammingLessons/Loops.pptx
@@ -224,7 +224,7 @@
           <a:p>
             <a:fld id="{58040048-1E4D-CD41-AC49-0750EB72586B}" type="datetimeFigureOut">
               <a:rPr lang="en-US" smtClean="0"/>
-              <a:t>1/17/21</a:t>
+              <a:t>1/18/2021</a:t>
             </a:fld>
             <a:endParaRPr lang="en-US"/>
           </a:p>
@@ -390,7 +390,7 @@
           <a:p>
             <a:fld id="{2B8484CF-5098-F24E-8881-583515D5C406}" type="datetimeFigureOut">
               <a:rPr lang="en-US" smtClean="0"/>
-              <a:t>1/17/21</a:t>
+              <a:t>1/18/2021</a:t>
             </a:fld>
             <a:endParaRPr lang="en-US"/>
           </a:p>
@@ -11478,7 +11478,7 @@
           <a:effectLst/>
           <a:extLst>
             <a:ext uri="{91240B29-F687-4f45-9708-019B960494DF}">
-              <a14:hiddenLine xmlns="" xmlns:a14="http://schemas.microsoft.com/office/drawing/2010/main" w="9525">
+              <a14:hiddenLine xmlns:a14="http://schemas.microsoft.com/office/drawing/2010/main" xmlns="" w="9525">
                 <a:solidFill>
                   <a:schemeClr val="tx1"/>
                 </a:solidFill>
@@ -11488,7 +11488,7 @@
               </a14:hiddenLine>
             </a:ext>
             <a:ext uri="{AF507438-7753-43e0-B8FC-AC1667EBCBE1}">
-              <a14:hiddenEffects xmlns="" xmlns:a14="http://schemas.microsoft.com/office/drawing/2010/main">
+              <a14:hiddenEffects xmlns:a14="http://schemas.microsoft.com/office/drawing/2010/main" xmlns="">
                 <a:effectLst>
                   <a:outerShdw dist="35921" dir="2700000" algn="ctr" rotWithShape="0">
                     <a:schemeClr val="bg2"/>
@@ -11829,7 +11829,7 @@
           <a:noFill/>
           <a:extLst>
             <a:ext uri="{909E8E84-426E-40dd-AFC4-6F175D3DCCD1}">
-              <a14:hiddenFill xmlns="" xmlns:a14="http://schemas.microsoft.com/office/drawing/2010/main">
+              <a14:hiddenFill xmlns:a14="http://schemas.microsoft.com/office/drawing/2010/main" xmlns="">
                 <a:solidFill>
                   <a:srgbClr val="FFFFFF"/>
                 </a:solidFill>
@@ -14558,7 +14558,7 @@
                 <a:cs typeface="Courier New"/>
                 <a:sym typeface="Courier New"/>
               </a:rPr>
-              <a:t>Yay!</a:t>
+              <a:t>Jump!</a:t>
             </a:r>
             <a:endParaRPr sz="1350" dirty="0">
               <a:highlight>
@@ -14614,7 +14614,7 @@
                 <a:cs typeface="Courier New"/>
                 <a:sym typeface="Courier New"/>
               </a:rPr>
-              <a:t>Yay!</a:t>
+              <a:t>Jump!</a:t>
             </a:r>
             <a:endParaRPr sz="1350" dirty="0">
               <a:highlight>
@@ -14689,7 +14689,7 @@
               </a:lnSpc>
             </a:pPr>
             <a:r>
-              <a:rPr lang="en" sz="1350" dirty="0">
+              <a:rPr lang="en" sz="1350">
                 <a:highlight>
                   <a:srgbClr val="FFFFFF"/>
                 </a:highlight>
@@ -14698,7 +14698,7 @@
                 <a:cs typeface="Courier New"/>
                 <a:sym typeface="Courier New"/>
               </a:rPr>
-              <a:t>Yay!</a:t>
+              <a:t>Jump!</a:t>
             </a:r>
             <a:endParaRPr sz="1350" dirty="0">
               <a:highlight>

</xml_diff>